<commit_message>
Atualiza diagrama e estrutura da documentação
</commit_message>
<xml_diff>
--- a/docs/Diagramas e Telas/Diagrama Projeto Chaos.pptx
+++ b/docs/Diagramas e Telas/Diagrama Projeto Chaos.pptx
@@ -241,7 +241,7 @@
           <a:p>
             <a:fld id="{1B9990B4-1470-43BD-AA9C-5EDB6161833D}" type="datetimeFigureOut">
               <a:rPr lang="pt-BR" smtClean="0"/>
-              <a:t>05/11/2019</a:t>
+              <a:t>15/11/2019</a:t>
             </a:fld>
             <a:endParaRPr lang="pt-BR"/>
           </a:p>
@@ -409,7 +409,7 @@
           <a:p>
             <a:fld id="{1B9990B4-1470-43BD-AA9C-5EDB6161833D}" type="datetimeFigureOut">
               <a:rPr lang="pt-BR" smtClean="0"/>
-              <a:t>05/11/2019</a:t>
+              <a:t>15/11/2019</a:t>
             </a:fld>
             <a:endParaRPr lang="pt-BR"/>
           </a:p>
@@ -587,7 +587,7 @@
           <a:p>
             <a:fld id="{1B9990B4-1470-43BD-AA9C-5EDB6161833D}" type="datetimeFigureOut">
               <a:rPr lang="pt-BR" smtClean="0"/>
-              <a:t>05/11/2019</a:t>
+              <a:t>15/11/2019</a:t>
             </a:fld>
             <a:endParaRPr lang="pt-BR"/>
           </a:p>
@@ -755,7 +755,7 @@
           <a:p>
             <a:fld id="{1B9990B4-1470-43BD-AA9C-5EDB6161833D}" type="datetimeFigureOut">
               <a:rPr lang="pt-BR" smtClean="0"/>
-              <a:t>05/11/2019</a:t>
+              <a:t>15/11/2019</a:t>
             </a:fld>
             <a:endParaRPr lang="pt-BR"/>
           </a:p>
@@ -1000,7 +1000,7 @@
           <a:p>
             <a:fld id="{1B9990B4-1470-43BD-AA9C-5EDB6161833D}" type="datetimeFigureOut">
               <a:rPr lang="pt-BR" smtClean="0"/>
-              <a:t>05/11/2019</a:t>
+              <a:t>15/11/2019</a:t>
             </a:fld>
             <a:endParaRPr lang="pt-BR"/>
           </a:p>
@@ -1229,7 +1229,7 @@
           <a:p>
             <a:fld id="{1B9990B4-1470-43BD-AA9C-5EDB6161833D}" type="datetimeFigureOut">
               <a:rPr lang="pt-BR" smtClean="0"/>
-              <a:t>05/11/2019</a:t>
+              <a:t>15/11/2019</a:t>
             </a:fld>
             <a:endParaRPr lang="pt-BR"/>
           </a:p>
@@ -1593,7 +1593,7 @@
           <a:p>
             <a:fld id="{1B9990B4-1470-43BD-AA9C-5EDB6161833D}" type="datetimeFigureOut">
               <a:rPr lang="pt-BR" smtClean="0"/>
-              <a:t>05/11/2019</a:t>
+              <a:t>15/11/2019</a:t>
             </a:fld>
             <a:endParaRPr lang="pt-BR"/>
           </a:p>
@@ -1710,7 +1710,7 @@
           <a:p>
             <a:fld id="{1B9990B4-1470-43BD-AA9C-5EDB6161833D}" type="datetimeFigureOut">
               <a:rPr lang="pt-BR" smtClean="0"/>
-              <a:t>05/11/2019</a:t>
+              <a:t>15/11/2019</a:t>
             </a:fld>
             <a:endParaRPr lang="pt-BR"/>
           </a:p>
@@ -1805,7 +1805,7 @@
           <a:p>
             <a:fld id="{1B9990B4-1470-43BD-AA9C-5EDB6161833D}" type="datetimeFigureOut">
               <a:rPr lang="pt-BR" smtClean="0"/>
-              <a:t>05/11/2019</a:t>
+              <a:t>15/11/2019</a:t>
             </a:fld>
             <a:endParaRPr lang="pt-BR"/>
           </a:p>
@@ -2080,7 +2080,7 @@
           <a:p>
             <a:fld id="{1B9990B4-1470-43BD-AA9C-5EDB6161833D}" type="datetimeFigureOut">
               <a:rPr lang="pt-BR" smtClean="0"/>
-              <a:t>05/11/2019</a:t>
+              <a:t>15/11/2019</a:t>
             </a:fld>
             <a:endParaRPr lang="pt-BR"/>
           </a:p>
@@ -2332,7 +2332,7 @@
           <a:p>
             <a:fld id="{1B9990B4-1470-43BD-AA9C-5EDB6161833D}" type="datetimeFigureOut">
               <a:rPr lang="pt-BR" smtClean="0"/>
-              <a:t>05/11/2019</a:t>
+              <a:t>15/11/2019</a:t>
             </a:fld>
             <a:endParaRPr lang="pt-BR"/>
           </a:p>
@@ -2543,7 +2543,7 @@
           <a:p>
             <a:fld id="{1B9990B4-1470-43BD-AA9C-5EDB6161833D}" type="datetimeFigureOut">
               <a:rPr lang="pt-BR" smtClean="0"/>
-              <a:t>05/11/2019</a:t>
+              <a:t>15/11/2019</a:t>
             </a:fld>
             <a:endParaRPr lang="pt-BR"/>
           </a:p>
@@ -3953,12 +3953,20 @@
           <a:lstStyle/>
           <a:p>
             <a:r>
+              <a:rPr lang="pt-BR" i="1" dirty="0" smtClean="0">
+                <a:latin typeface="Roboto" panose="02000000000000000000" pitchFamily="2" charset="0"/>
+                <a:ea typeface="Roboto" panose="02000000000000000000" pitchFamily="2" charset="0"/>
+                <a:cs typeface="Roboto" panose="02000000000000000000" pitchFamily="2" charset="0"/>
+              </a:rPr>
+              <a:t>ATAQUE </a:t>
+            </a:r>
+            <a:r>
               <a:rPr lang="pt-BR" i="1" dirty="0">
                 <a:latin typeface="Roboto" panose="02000000000000000000" pitchFamily="2" charset="0"/>
                 <a:ea typeface="Roboto" panose="02000000000000000000" pitchFamily="2" charset="0"/>
                 <a:cs typeface="Roboto" panose="02000000000000000000" pitchFamily="2" charset="0"/>
               </a:rPr>
-              <a:t>ATAQUE DE </a:t>
+              <a:t>DE </a:t>
             </a:r>
             <a:r>
               <a:rPr lang="pt-BR" b="1" i="1" dirty="0">
@@ -4026,12 +4034,20 @@
           <a:lstStyle/>
           <a:p>
             <a:r>
+              <a:rPr lang="pt-BR" i="1" dirty="0" smtClean="0">
+                <a:latin typeface="Roboto" panose="02000000000000000000" pitchFamily="2" charset="0"/>
+                <a:ea typeface="Roboto" panose="02000000000000000000" pitchFamily="2" charset="0"/>
+                <a:cs typeface="Roboto" panose="02000000000000000000" pitchFamily="2" charset="0"/>
+              </a:rPr>
+              <a:t>CRIAÇÃO </a:t>
+            </a:r>
+            <a:r>
               <a:rPr lang="pt-BR" i="1" dirty="0">
                 <a:latin typeface="Roboto" panose="02000000000000000000" pitchFamily="2" charset="0"/>
                 <a:ea typeface="Roboto" panose="02000000000000000000" pitchFamily="2" charset="0"/>
                 <a:cs typeface="Roboto" panose="02000000000000000000" pitchFamily="2" charset="0"/>
               </a:rPr>
-              <a:t>AUTOMATIZAÇÃO DOS EXPERIMENTOS COM </a:t>
+              <a:t>DOS EXPERIMENTOS COM </a:t>
             </a:r>
             <a:r>
               <a:rPr lang="pt-BR" b="1" i="1" dirty="0">

</xml_diff>